<commit_message>
Refine structured credential model
</commit_message>
<xml_diff>
--- a/Documentation/TDW-TCSServer 0.25.pptx
+++ b/Documentation/TDW-TCSServer 0.25.pptx
@@ -5,13 +5,14 @@
     <p:sldMasterId id="2147483648" r:id="rId1"/>
   </p:sldMasterIdLst>
   <p:notesMasterIdLst>
-    <p:notesMasterId r:id="rId6"/>
+    <p:notesMasterId r:id="rId7"/>
   </p:notesMasterIdLst>
   <p:sldIdLst>
     <p:sldId id="265" r:id="rId2"/>
     <p:sldId id="266" r:id="rId3"/>
     <p:sldId id="268" r:id="rId4"/>
     <p:sldId id="269" r:id="rId5"/>
+    <p:sldId id="270" r:id="rId6"/>
   </p:sldIdLst>
   <p:sldSz cx="12192000" cy="6858000"/>
   <p:notesSz cx="6858000" cy="9144000"/>
@@ -200,7 +201,7 @@
           <a:p>
             <a:fld id="{0FE97333-F009-4A3A-B903-E0B0959E57FD}" type="datetimeFigureOut">
               <a:rPr lang="en-CA" smtClean="0"/>
-              <a:t>2021-07-17</a:t>
+              <a:t>2021-07-18</a:t>
             </a:fld>
             <a:endParaRPr lang="en-CA" dirty="0"/>
           </a:p>
@@ -701,7 +702,7 @@
           <a:p>
             <a:fld id="{8336BBF9-328D-4796-8CD7-E88E84193EF3}" type="datetimeFigureOut">
               <a:rPr lang="en-CA" smtClean="0"/>
-              <a:t>2021-07-17</a:t>
+              <a:t>2021-07-18</a:t>
             </a:fld>
             <a:endParaRPr lang="en-CA" dirty="0"/>
           </a:p>
@@ -901,7 +902,7 @@
           <a:p>
             <a:fld id="{8336BBF9-328D-4796-8CD7-E88E84193EF3}" type="datetimeFigureOut">
               <a:rPr lang="en-CA" smtClean="0"/>
-              <a:t>2021-07-17</a:t>
+              <a:t>2021-07-18</a:t>
             </a:fld>
             <a:endParaRPr lang="en-CA" dirty="0"/>
           </a:p>
@@ -1111,7 +1112,7 @@
           <a:p>
             <a:fld id="{8336BBF9-328D-4796-8CD7-E88E84193EF3}" type="datetimeFigureOut">
               <a:rPr lang="en-CA" smtClean="0"/>
-              <a:t>2021-07-17</a:t>
+              <a:t>2021-07-18</a:t>
             </a:fld>
             <a:endParaRPr lang="en-CA" dirty="0"/>
           </a:p>
@@ -1311,7 +1312,7 @@
           <a:p>
             <a:fld id="{8336BBF9-328D-4796-8CD7-E88E84193EF3}" type="datetimeFigureOut">
               <a:rPr lang="en-CA" smtClean="0"/>
-              <a:t>2021-07-17</a:t>
+              <a:t>2021-07-18</a:t>
             </a:fld>
             <a:endParaRPr lang="en-CA" dirty="0"/>
           </a:p>
@@ -1587,7 +1588,7 @@
           <a:p>
             <a:fld id="{8336BBF9-328D-4796-8CD7-E88E84193EF3}" type="datetimeFigureOut">
               <a:rPr lang="en-CA" smtClean="0"/>
-              <a:t>2021-07-17</a:t>
+              <a:t>2021-07-18</a:t>
             </a:fld>
             <a:endParaRPr lang="en-CA" dirty="0"/>
           </a:p>
@@ -1855,7 +1856,7 @@
           <a:p>
             <a:fld id="{8336BBF9-328D-4796-8CD7-E88E84193EF3}" type="datetimeFigureOut">
               <a:rPr lang="en-CA" smtClean="0"/>
-              <a:t>2021-07-17</a:t>
+              <a:t>2021-07-18</a:t>
             </a:fld>
             <a:endParaRPr lang="en-CA" dirty="0"/>
           </a:p>
@@ -2270,7 +2271,7 @@
           <a:p>
             <a:fld id="{8336BBF9-328D-4796-8CD7-E88E84193EF3}" type="datetimeFigureOut">
               <a:rPr lang="en-CA" smtClean="0"/>
-              <a:t>2021-07-17</a:t>
+              <a:t>2021-07-18</a:t>
             </a:fld>
             <a:endParaRPr lang="en-CA" dirty="0"/>
           </a:p>
@@ -2412,7 +2413,7 @@
           <a:p>
             <a:fld id="{8336BBF9-328D-4796-8CD7-E88E84193EF3}" type="datetimeFigureOut">
               <a:rPr lang="en-CA" smtClean="0"/>
-              <a:t>2021-07-17</a:t>
+              <a:t>2021-07-18</a:t>
             </a:fld>
             <a:endParaRPr lang="en-CA" dirty="0"/>
           </a:p>
@@ -2525,7 +2526,7 @@
           <a:p>
             <a:fld id="{8336BBF9-328D-4796-8CD7-E88E84193EF3}" type="datetimeFigureOut">
               <a:rPr lang="en-CA" smtClean="0"/>
-              <a:t>2021-07-17</a:t>
+              <a:t>2021-07-18</a:t>
             </a:fld>
             <a:endParaRPr lang="en-CA" dirty="0"/>
           </a:p>
@@ -2838,7 +2839,7 @@
           <a:p>
             <a:fld id="{8336BBF9-328D-4796-8CD7-E88E84193EF3}" type="datetimeFigureOut">
               <a:rPr lang="en-CA" smtClean="0"/>
-              <a:t>2021-07-17</a:t>
+              <a:t>2021-07-18</a:t>
             </a:fld>
             <a:endParaRPr lang="en-CA" dirty="0"/>
           </a:p>
@@ -3127,7 +3128,7 @@
           <a:p>
             <a:fld id="{8336BBF9-328D-4796-8CD7-E88E84193EF3}" type="datetimeFigureOut">
               <a:rPr lang="en-CA" smtClean="0"/>
-              <a:t>2021-07-17</a:t>
+              <a:t>2021-07-18</a:t>
             </a:fld>
             <a:endParaRPr lang="en-CA" dirty="0"/>
           </a:p>
@@ -3370,7 +3371,7 @@
           <a:p>
             <a:fld id="{8336BBF9-328D-4796-8CD7-E88E84193EF3}" type="datetimeFigureOut">
               <a:rPr lang="en-CA" smtClean="0"/>
-              <a:t>2021-07-17</a:t>
+              <a:t>2021-07-18</a:t>
             </a:fld>
             <a:endParaRPr lang="en-CA" dirty="0"/>
           </a:p>
@@ -10706,7 +10707,7 @@
             <a:pPr algn="ctr"/>
             <a:r>
               <a:rPr lang="en-CA" sz="1400" dirty="0"/>
-              <a:t>Verifiable Data Ledger (VDR)</a:t>
+              <a:t>Verifiable Data Registry (VDR)</a:t>
             </a:r>
           </a:p>
         </p:txBody>
@@ -12219,7 +12220,7 @@
             <a:pPr algn="ctr"/>
             <a:r>
               <a:rPr lang="en-CA" sz="1400" dirty="0"/>
-              <a:t>Verifiable Data Ledger (VDR)</a:t>
+              <a:t>Verifiable Data Registry (VDR)</a:t>
             </a:r>
           </a:p>
         </p:txBody>
@@ -13356,6 +13357,2253 @@
     <p:extLst>
       <p:ext uri="{BB962C8B-B14F-4D97-AF65-F5344CB8AC3E}">
         <p14:creationId xmlns:p14="http://schemas.microsoft.com/office/powerpoint/2010/main" val="3720011522"/>
+      </p:ext>
+    </p:extLst>
+  </p:cSld>
+  <p:clrMapOvr>
+    <a:masterClrMapping/>
+  </p:clrMapOvr>
+</p:sld>
+</file>
+
+<file path=ppt/slides/slide5.xml><?xml version="1.0" encoding="utf-8"?>
+<p:sld xmlns:a="http://schemas.openxmlformats.org/drawingml/2006/main" xmlns:r="http://schemas.openxmlformats.org/officeDocument/2006/relationships" xmlns:p="http://schemas.openxmlformats.org/presentationml/2006/main">
+  <p:cSld>
+    <p:spTree>
+      <p:nvGrpSpPr>
+        <p:cNvPr id="1" name=""/>
+        <p:cNvGrpSpPr/>
+        <p:nvPr/>
+      </p:nvGrpSpPr>
+      <p:grpSpPr>
+        <a:xfrm>
+          <a:off x="0" y="0"/>
+          <a:ext cx="0" cy="0"/>
+          <a:chOff x="0" y="0"/>
+          <a:chExt cx="0" cy="0"/>
+        </a:xfrm>
+      </p:grpSpPr>
+      <p:sp>
+        <p:nvSpPr>
+          <p:cNvPr id="2" name="Rectangle: Rounded Corners 1">
+            <a:extLst>
+              <a:ext uri="{FF2B5EF4-FFF2-40B4-BE49-F238E27FC236}">
+                <a16:creationId xmlns:a16="http://schemas.microsoft.com/office/drawing/2014/main" id="{61B7A03B-6FEA-4EAB-89A2-396185A258F9}"/>
+              </a:ext>
+            </a:extLst>
+          </p:cNvPr>
+          <p:cNvSpPr/>
+          <p:nvPr/>
+        </p:nvSpPr>
+        <p:spPr>
+          <a:xfrm>
+            <a:off x="484258" y="-1026"/>
+            <a:ext cx="3795130" cy="470976"/>
+          </a:xfrm>
+          <a:prstGeom prst="roundRect">
+            <a:avLst/>
+          </a:prstGeom>
+        </p:spPr>
+        <p:style>
+          <a:lnRef idx="2">
+            <a:schemeClr val="accent5">
+              <a:shade val="50000"/>
+            </a:schemeClr>
+          </a:lnRef>
+          <a:fillRef idx="1">
+            <a:schemeClr val="accent5"/>
+          </a:fillRef>
+          <a:effectRef idx="0">
+            <a:schemeClr val="accent5"/>
+          </a:effectRef>
+          <a:fontRef idx="minor">
+            <a:schemeClr val="lt1"/>
+          </a:fontRef>
+        </p:style>
+        <p:txBody>
+          <a:bodyPr rtlCol="0" anchor="ctr"/>
+          <a:lstStyle/>
+          <a:p>
+            <a:pPr algn="ctr"/>
+            <a:r>
+              <a:rPr lang="en-CA" sz="1400" dirty="0"/>
+              <a:t>Alice’s Personal Wallet</a:t>
+            </a:r>
+            <a:endParaRPr lang="en-CA" sz="1200" dirty="0"/>
+          </a:p>
+        </p:txBody>
+      </p:sp>
+      <p:sp>
+        <p:nvSpPr>
+          <p:cNvPr id="3" name="Rectangle: Rounded Corners 2">
+            <a:extLst>
+              <a:ext uri="{FF2B5EF4-FFF2-40B4-BE49-F238E27FC236}">
+                <a16:creationId xmlns:a16="http://schemas.microsoft.com/office/drawing/2014/main" id="{D2D4D3D3-1D8E-424F-AB21-488657575F28}"/>
+              </a:ext>
+            </a:extLst>
+          </p:cNvPr>
+          <p:cNvSpPr/>
+          <p:nvPr/>
+        </p:nvSpPr>
+        <p:spPr>
+          <a:xfrm>
+            <a:off x="0" y="2117879"/>
+            <a:ext cx="12191993" cy="5252186"/>
+          </a:xfrm>
+          <a:prstGeom prst="roundRect">
+            <a:avLst>
+              <a:gd name="adj" fmla="val 3591"/>
+            </a:avLst>
+          </a:prstGeom>
+          <a:solidFill>
+            <a:srgbClr val="0070C0"/>
+          </a:solidFill>
+        </p:spPr>
+        <p:style>
+          <a:lnRef idx="2">
+            <a:schemeClr val="accent1">
+              <a:shade val="50000"/>
+            </a:schemeClr>
+          </a:lnRef>
+          <a:fillRef idx="1">
+            <a:schemeClr val="accent1"/>
+          </a:fillRef>
+          <a:effectRef idx="0">
+            <a:schemeClr val="accent1"/>
+          </a:effectRef>
+          <a:fontRef idx="minor">
+            <a:schemeClr val="lt1"/>
+          </a:fontRef>
+        </p:style>
+        <p:txBody>
+          <a:bodyPr rtlCol="0" anchor="t"/>
+          <a:lstStyle/>
+          <a:p>
+            <a:pPr algn="ctr"/>
+            <a:r>
+              <a:rPr lang="en-CA" sz="1400" dirty="0"/>
+              <a:t>Verifiable Data Registry (VDR)</a:t>
+            </a:r>
+          </a:p>
+        </p:txBody>
+      </p:sp>
+      <p:sp>
+        <p:nvSpPr>
+          <p:cNvPr id="4" name="Rectangle: Rounded Corners 3">
+            <a:extLst>
+              <a:ext uri="{FF2B5EF4-FFF2-40B4-BE49-F238E27FC236}">
+                <a16:creationId xmlns:a16="http://schemas.microsoft.com/office/drawing/2014/main" id="{12048BDF-4DF6-46CD-8B94-14BA56B8680E}"/>
+              </a:ext>
+            </a:extLst>
+          </p:cNvPr>
+          <p:cNvSpPr/>
+          <p:nvPr/>
+        </p:nvSpPr>
+        <p:spPr>
+          <a:xfrm>
+            <a:off x="484258" y="947019"/>
+            <a:ext cx="3795130" cy="470976"/>
+          </a:xfrm>
+          <a:prstGeom prst="roundRect">
+            <a:avLst/>
+          </a:prstGeom>
+          <a:solidFill>
+            <a:schemeClr val="accent4">
+              <a:lumMod val="75000"/>
+            </a:schemeClr>
+          </a:solidFill>
+        </p:spPr>
+        <p:style>
+          <a:lnRef idx="2">
+            <a:schemeClr val="accent4">
+              <a:shade val="50000"/>
+            </a:schemeClr>
+          </a:lnRef>
+          <a:fillRef idx="1">
+            <a:schemeClr val="accent4"/>
+          </a:fillRef>
+          <a:effectRef idx="0">
+            <a:schemeClr val="accent4"/>
+          </a:effectRef>
+          <a:fontRef idx="minor">
+            <a:schemeClr val="lt1"/>
+          </a:fontRef>
+        </p:style>
+        <p:txBody>
+          <a:bodyPr rtlCol="0" anchor="ctr"/>
+          <a:lstStyle/>
+          <a:p>
+            <a:pPr algn="ctr"/>
+            <a:r>
+              <a:rPr lang="en-CA" sz="1400" dirty="0"/>
+              <a:t>Alice’s Personal Agent</a:t>
+            </a:r>
+          </a:p>
+          <a:p>
+            <a:pPr algn="ctr"/>
+            <a:r>
+              <a:rPr lang="en-CA" sz="1400" dirty="0"/>
+              <a:t>(Self-Issuer, Holder)</a:t>
+            </a:r>
+          </a:p>
+        </p:txBody>
+      </p:sp>
+      <p:sp>
+        <p:nvSpPr>
+          <p:cNvPr id="5" name="Rectangle: Rounded Corners 4">
+            <a:extLst>
+              <a:ext uri="{FF2B5EF4-FFF2-40B4-BE49-F238E27FC236}">
+                <a16:creationId xmlns:a16="http://schemas.microsoft.com/office/drawing/2014/main" id="{F2458E9D-1439-44DF-A01D-63B1DBE646E2}"/>
+              </a:ext>
+            </a:extLst>
+          </p:cNvPr>
+          <p:cNvSpPr/>
+          <p:nvPr/>
+        </p:nvSpPr>
+        <p:spPr>
+          <a:xfrm>
+            <a:off x="365385" y="3226795"/>
+            <a:ext cx="2223593" cy="1149771"/>
+          </a:xfrm>
+          <a:prstGeom prst="roundRect">
+            <a:avLst/>
+          </a:prstGeom>
+        </p:spPr>
+        <p:style>
+          <a:lnRef idx="2">
+            <a:schemeClr val="accent4">
+              <a:shade val="50000"/>
+            </a:schemeClr>
+          </a:lnRef>
+          <a:fillRef idx="1">
+            <a:schemeClr val="accent4"/>
+          </a:fillRef>
+          <a:effectRef idx="0">
+            <a:schemeClr val="accent4"/>
+          </a:effectRef>
+          <a:fontRef idx="minor">
+            <a:schemeClr val="lt1"/>
+          </a:fontRef>
+        </p:style>
+        <p:txBody>
+          <a:bodyPr rtlCol="0" anchor="t"/>
+          <a:lstStyle/>
+          <a:p>
+            <a:pPr algn="ctr"/>
+            <a:r>
+              <a:rPr lang="en-CA" sz="1400" dirty="0"/>
+              <a:t>Alice’s UIR Entry</a:t>
+            </a:r>
+          </a:p>
+          <a:p>
+            <a:pPr algn="ctr"/>
+            <a:r>
+              <a:rPr lang="en-CA" sz="1400" dirty="0"/>
+              <a:t>(DID Doc)</a:t>
+            </a:r>
+          </a:p>
+          <a:p>
+            <a:pPr algn="ctr"/>
+            <a:r>
+              <a:rPr lang="en-CA" sz="1400" dirty="0"/>
+              <a:t>did:svrn:person:1234</a:t>
+            </a:r>
+          </a:p>
+        </p:txBody>
+      </p:sp>
+      <p:sp>
+        <p:nvSpPr>
+          <p:cNvPr id="6" name="Rectangle: Rounded Corners 5">
+            <a:extLst>
+              <a:ext uri="{FF2B5EF4-FFF2-40B4-BE49-F238E27FC236}">
+                <a16:creationId xmlns:a16="http://schemas.microsoft.com/office/drawing/2014/main" id="{164A9053-5F70-473F-98F2-7A5719DB7280}"/>
+              </a:ext>
+            </a:extLst>
+          </p:cNvPr>
+          <p:cNvSpPr/>
+          <p:nvPr/>
+        </p:nvSpPr>
+        <p:spPr>
+          <a:xfrm>
+            <a:off x="2915384" y="3226796"/>
+            <a:ext cx="2575707" cy="540532"/>
+          </a:xfrm>
+          <a:prstGeom prst="roundRect">
+            <a:avLst/>
+          </a:prstGeom>
+        </p:spPr>
+        <p:style>
+          <a:lnRef idx="2">
+            <a:schemeClr val="accent4">
+              <a:shade val="50000"/>
+            </a:schemeClr>
+          </a:lnRef>
+          <a:fillRef idx="1">
+            <a:schemeClr val="accent4"/>
+          </a:fillRef>
+          <a:effectRef idx="0">
+            <a:schemeClr val="accent4"/>
+          </a:effectRef>
+          <a:fontRef idx="minor">
+            <a:schemeClr val="lt1"/>
+          </a:fontRef>
+        </p:style>
+        <p:txBody>
+          <a:bodyPr rtlCol="0" anchor="t"/>
+          <a:lstStyle/>
+          <a:p>
+            <a:pPr algn="ctr"/>
+            <a:r>
+              <a:rPr lang="en-CA" sz="1400" dirty="0"/>
+              <a:t>Alice’s Agent SEPR Entry</a:t>
+            </a:r>
+            <a:br>
+              <a:rPr lang="en-CA" sz="1400" dirty="0"/>
+            </a:br>
+            <a:r>
+              <a:rPr lang="en-CA" sz="1400" dirty="0"/>
+              <a:t>did:svrn:sepr:2345</a:t>
+            </a:r>
+          </a:p>
+        </p:txBody>
+      </p:sp>
+      <p:cxnSp>
+        <p:nvCxnSpPr>
+          <p:cNvPr id="8" name="Straight Arrow Connector 7">
+            <a:extLst>
+              <a:ext uri="{FF2B5EF4-FFF2-40B4-BE49-F238E27FC236}">
+                <a16:creationId xmlns:a16="http://schemas.microsoft.com/office/drawing/2014/main" id="{61B35E89-6FA3-489E-BEEC-18F1FEAC60B6}"/>
+              </a:ext>
+            </a:extLst>
+          </p:cNvPr>
+          <p:cNvCxnSpPr>
+            <a:cxnSpLocks/>
+            <a:stCxn id="5" idx="3"/>
+            <a:endCxn id="6" idx="1"/>
+          </p:cNvCxnSpPr>
+          <p:nvPr/>
+        </p:nvCxnSpPr>
+        <p:spPr>
+          <a:xfrm flipV="1">
+            <a:off x="2588978" y="3497062"/>
+            <a:ext cx="326406" cy="304619"/>
+          </a:xfrm>
+          <a:prstGeom prst="straightConnector1">
+            <a:avLst/>
+          </a:prstGeom>
+          <a:ln w="38100">
+            <a:solidFill>
+              <a:srgbClr val="000000"/>
+            </a:solidFill>
+            <a:tailEnd type="triangle"/>
+          </a:ln>
+        </p:spPr>
+        <p:style>
+          <a:lnRef idx="1">
+            <a:schemeClr val="accent1"/>
+          </a:lnRef>
+          <a:fillRef idx="0">
+            <a:schemeClr val="accent1"/>
+          </a:fillRef>
+          <a:effectRef idx="0">
+            <a:schemeClr val="accent1"/>
+          </a:effectRef>
+          <a:fontRef idx="minor">
+            <a:schemeClr val="tx1"/>
+          </a:fontRef>
+        </p:style>
+      </p:cxnSp>
+      <p:cxnSp>
+        <p:nvCxnSpPr>
+          <p:cNvPr id="10" name="Straight Arrow Connector 9">
+            <a:extLst>
+              <a:ext uri="{FF2B5EF4-FFF2-40B4-BE49-F238E27FC236}">
+                <a16:creationId xmlns:a16="http://schemas.microsoft.com/office/drawing/2014/main" id="{077C6C0B-BE86-4BA5-B433-63D33456AC97}"/>
+              </a:ext>
+            </a:extLst>
+          </p:cNvPr>
+          <p:cNvCxnSpPr>
+            <a:cxnSpLocks/>
+          </p:cNvCxnSpPr>
+          <p:nvPr/>
+        </p:nvCxnSpPr>
+        <p:spPr>
+          <a:xfrm flipV="1">
+            <a:off x="3222510" y="1417995"/>
+            <a:ext cx="0" cy="1808800"/>
+          </a:xfrm>
+          <a:prstGeom prst="straightConnector1">
+            <a:avLst/>
+          </a:prstGeom>
+          <a:ln w="38100">
+            <a:solidFill>
+              <a:srgbClr val="000000"/>
+            </a:solidFill>
+            <a:tailEnd type="triangle"/>
+          </a:ln>
+        </p:spPr>
+        <p:style>
+          <a:lnRef idx="1">
+            <a:schemeClr val="accent1"/>
+          </a:lnRef>
+          <a:fillRef idx="0">
+            <a:schemeClr val="accent1"/>
+          </a:fillRef>
+          <a:effectRef idx="0">
+            <a:schemeClr val="accent1"/>
+          </a:effectRef>
+          <a:fontRef idx="minor">
+            <a:schemeClr val="tx1"/>
+          </a:fontRef>
+        </p:style>
+      </p:cxnSp>
+      <p:sp>
+        <p:nvSpPr>
+          <p:cNvPr id="19" name="TextBox 18">
+            <a:extLst>
+              <a:ext uri="{FF2B5EF4-FFF2-40B4-BE49-F238E27FC236}">
+                <a16:creationId xmlns:a16="http://schemas.microsoft.com/office/drawing/2014/main" id="{83B53071-C064-4EA2-98C9-A976DA9E358F}"/>
+              </a:ext>
+            </a:extLst>
+          </p:cNvPr>
+          <p:cNvSpPr txBox="1"/>
+          <p:nvPr/>
+        </p:nvSpPr>
+        <p:spPr>
+          <a:xfrm>
+            <a:off x="64267" y="4124446"/>
+            <a:ext cx="1349250" cy="523220"/>
+          </a:xfrm>
+          <a:prstGeom prst="rect">
+            <a:avLst/>
+          </a:prstGeom>
+          <a:solidFill>
+            <a:schemeClr val="bg1">
+              <a:lumMod val="95000"/>
+            </a:schemeClr>
+          </a:solidFill>
+          <a:ln>
+            <a:solidFill>
+              <a:schemeClr val="bg1">
+                <a:lumMod val="50000"/>
+              </a:schemeClr>
+            </a:solidFill>
+          </a:ln>
+        </p:spPr>
+        <p:txBody>
+          <a:bodyPr wrap="square" rtlCol="0">
+            <a:spAutoFit/>
+          </a:bodyPr>
+          <a:lstStyle/>
+          <a:p>
+            <a:pPr marL="285750" indent="-285750">
+              <a:buFontTx/>
+              <a:buChar char="-"/>
+            </a:pPr>
+            <a:r>
+              <a:rPr lang="en-CA" sz="1400" dirty="0"/>
+              <a:t>Self Signed</a:t>
+            </a:r>
+          </a:p>
+          <a:p>
+            <a:pPr marL="285750" indent="-285750">
+              <a:buFontTx/>
+              <a:buChar char="-"/>
+            </a:pPr>
+            <a:r>
+              <a:rPr lang="en-CA" sz="1400" dirty="0"/>
+              <a:t>Notarized</a:t>
+            </a:r>
+          </a:p>
+        </p:txBody>
+      </p:sp>
+      <p:sp>
+        <p:nvSpPr>
+          <p:cNvPr id="20" name="Rectangle: Rounded Corners 19">
+            <a:extLst>
+              <a:ext uri="{FF2B5EF4-FFF2-40B4-BE49-F238E27FC236}">
+                <a16:creationId xmlns:a16="http://schemas.microsoft.com/office/drawing/2014/main" id="{177B646C-C469-41A7-9300-F668167BD06A}"/>
+              </a:ext>
+            </a:extLst>
+          </p:cNvPr>
+          <p:cNvSpPr/>
+          <p:nvPr/>
+        </p:nvSpPr>
+        <p:spPr>
+          <a:xfrm>
+            <a:off x="1215776" y="4671877"/>
+            <a:ext cx="2223593" cy="1149771"/>
+          </a:xfrm>
+          <a:prstGeom prst="roundRect">
+            <a:avLst/>
+          </a:prstGeom>
+        </p:spPr>
+        <p:style>
+          <a:lnRef idx="2">
+            <a:schemeClr val="accent4">
+              <a:shade val="50000"/>
+            </a:schemeClr>
+          </a:lnRef>
+          <a:fillRef idx="1">
+            <a:schemeClr val="accent4"/>
+          </a:fillRef>
+          <a:effectRef idx="0">
+            <a:schemeClr val="accent4"/>
+          </a:effectRef>
+          <a:fontRef idx="minor">
+            <a:schemeClr val="lt1"/>
+          </a:fontRef>
+        </p:style>
+        <p:txBody>
+          <a:bodyPr rtlCol="0" anchor="t"/>
+          <a:lstStyle/>
+          <a:p>
+            <a:pPr algn="ctr"/>
+            <a:r>
+              <a:rPr lang="en-CA" sz="1400" dirty="0"/>
+              <a:t>Notary’s UIR Entry</a:t>
+            </a:r>
+          </a:p>
+          <a:p>
+            <a:pPr algn="ctr"/>
+            <a:r>
+              <a:rPr lang="en-CA" sz="1400" dirty="0"/>
+              <a:t>(DID Doc)</a:t>
+            </a:r>
+          </a:p>
+          <a:p>
+            <a:pPr algn="ctr"/>
+            <a:r>
+              <a:rPr lang="en-CA" sz="1400" dirty="0"/>
+              <a:t>did:svrn:notary:3456</a:t>
+            </a:r>
+          </a:p>
+        </p:txBody>
+      </p:sp>
+      <p:sp>
+        <p:nvSpPr>
+          <p:cNvPr id="21" name="Rectangle: Rounded Corners 20">
+            <a:extLst>
+              <a:ext uri="{FF2B5EF4-FFF2-40B4-BE49-F238E27FC236}">
+                <a16:creationId xmlns:a16="http://schemas.microsoft.com/office/drawing/2014/main" id="{C571021F-5938-4640-A406-65F1D32949D7}"/>
+              </a:ext>
+            </a:extLst>
+          </p:cNvPr>
+          <p:cNvSpPr/>
+          <p:nvPr/>
+        </p:nvSpPr>
+        <p:spPr>
+          <a:xfrm>
+            <a:off x="3765775" y="4671878"/>
+            <a:ext cx="2575712" cy="540533"/>
+          </a:xfrm>
+          <a:prstGeom prst="roundRect">
+            <a:avLst/>
+          </a:prstGeom>
+        </p:spPr>
+        <p:style>
+          <a:lnRef idx="2">
+            <a:schemeClr val="accent4">
+              <a:shade val="50000"/>
+            </a:schemeClr>
+          </a:lnRef>
+          <a:fillRef idx="1">
+            <a:schemeClr val="accent4"/>
+          </a:fillRef>
+          <a:effectRef idx="0">
+            <a:schemeClr val="accent4"/>
+          </a:effectRef>
+          <a:fontRef idx="minor">
+            <a:schemeClr val="lt1"/>
+          </a:fontRef>
+        </p:style>
+        <p:txBody>
+          <a:bodyPr rtlCol="0" anchor="t"/>
+          <a:lstStyle/>
+          <a:p>
+            <a:pPr algn="ctr"/>
+            <a:r>
+              <a:rPr lang="en-CA" sz="1400" dirty="0"/>
+              <a:t>Notary’s Agent SEPR Entry</a:t>
+            </a:r>
+          </a:p>
+          <a:p>
+            <a:pPr algn="ctr"/>
+            <a:r>
+              <a:rPr lang="en-CA" sz="1400" dirty="0"/>
+              <a:t>did:svrn:sepr:4567</a:t>
+            </a:r>
+          </a:p>
+        </p:txBody>
+      </p:sp>
+      <p:cxnSp>
+        <p:nvCxnSpPr>
+          <p:cNvPr id="22" name="Straight Arrow Connector 21">
+            <a:extLst>
+              <a:ext uri="{FF2B5EF4-FFF2-40B4-BE49-F238E27FC236}">
+                <a16:creationId xmlns:a16="http://schemas.microsoft.com/office/drawing/2014/main" id="{94458CCD-F925-4157-9EFF-AF33CFA64777}"/>
+              </a:ext>
+            </a:extLst>
+          </p:cNvPr>
+          <p:cNvCxnSpPr>
+            <a:cxnSpLocks/>
+            <a:stCxn id="20" idx="3"/>
+            <a:endCxn id="21" idx="1"/>
+          </p:cNvCxnSpPr>
+          <p:nvPr/>
+        </p:nvCxnSpPr>
+        <p:spPr>
+          <a:xfrm flipV="1">
+            <a:off x="3439369" y="4942145"/>
+            <a:ext cx="326406" cy="304618"/>
+          </a:xfrm>
+          <a:prstGeom prst="straightConnector1">
+            <a:avLst/>
+          </a:prstGeom>
+          <a:ln w="38100">
+            <a:solidFill>
+              <a:srgbClr val="000000"/>
+            </a:solidFill>
+            <a:tailEnd type="triangle"/>
+          </a:ln>
+        </p:spPr>
+        <p:style>
+          <a:lnRef idx="1">
+            <a:schemeClr val="accent1"/>
+          </a:lnRef>
+          <a:fillRef idx="0">
+            <a:schemeClr val="accent1"/>
+          </a:fillRef>
+          <a:effectRef idx="0">
+            <a:schemeClr val="accent1"/>
+          </a:effectRef>
+          <a:fontRef idx="minor">
+            <a:schemeClr val="tx1"/>
+          </a:fontRef>
+        </p:style>
+      </p:cxnSp>
+      <p:sp>
+        <p:nvSpPr>
+          <p:cNvPr id="28" name="Rectangle: Rounded Corners 27">
+            <a:extLst>
+              <a:ext uri="{FF2B5EF4-FFF2-40B4-BE49-F238E27FC236}">
+                <a16:creationId xmlns:a16="http://schemas.microsoft.com/office/drawing/2014/main" id="{49946C88-BA36-48F0-A0D7-13C32342219E}"/>
+              </a:ext>
+            </a:extLst>
+          </p:cNvPr>
+          <p:cNvSpPr/>
+          <p:nvPr/>
+        </p:nvSpPr>
+        <p:spPr>
+          <a:xfrm>
+            <a:off x="2915382" y="3836034"/>
+            <a:ext cx="2575711" cy="540532"/>
+          </a:xfrm>
+          <a:prstGeom prst="roundRect">
+            <a:avLst/>
+          </a:prstGeom>
+        </p:spPr>
+        <p:style>
+          <a:lnRef idx="2">
+            <a:schemeClr val="accent4">
+              <a:shade val="50000"/>
+            </a:schemeClr>
+          </a:lnRef>
+          <a:fillRef idx="1">
+            <a:schemeClr val="accent4"/>
+          </a:fillRef>
+          <a:effectRef idx="0">
+            <a:schemeClr val="accent4"/>
+          </a:effectRef>
+          <a:fontRef idx="minor">
+            <a:schemeClr val="lt1"/>
+          </a:fontRef>
+        </p:style>
+        <p:txBody>
+          <a:bodyPr rtlCol="0" anchor="t"/>
+          <a:lstStyle/>
+          <a:p>
+            <a:pPr algn="ctr"/>
+            <a:r>
+              <a:rPr lang="en-CA" sz="1400" dirty="0"/>
+              <a:t>Alice’s Role RR Entry</a:t>
+            </a:r>
+            <a:br>
+              <a:rPr lang="en-CA" sz="1400" dirty="0"/>
+            </a:br>
+            <a:r>
+              <a:rPr lang="en-CA" sz="1400" dirty="0"/>
+              <a:t>did:svrn:role:5678 = PERSON</a:t>
+            </a:r>
+          </a:p>
+        </p:txBody>
+      </p:sp>
+      <p:cxnSp>
+        <p:nvCxnSpPr>
+          <p:cNvPr id="30" name="Straight Arrow Connector 29">
+            <a:extLst>
+              <a:ext uri="{FF2B5EF4-FFF2-40B4-BE49-F238E27FC236}">
+                <a16:creationId xmlns:a16="http://schemas.microsoft.com/office/drawing/2014/main" id="{3C15496A-93CC-4C66-92C3-65098E8614D6}"/>
+              </a:ext>
+            </a:extLst>
+          </p:cNvPr>
+          <p:cNvCxnSpPr>
+            <a:cxnSpLocks/>
+            <a:stCxn id="5" idx="3"/>
+            <a:endCxn id="28" idx="1"/>
+          </p:cNvCxnSpPr>
+          <p:nvPr/>
+        </p:nvCxnSpPr>
+        <p:spPr>
+          <a:xfrm>
+            <a:off x="2588978" y="3801681"/>
+            <a:ext cx="326404" cy="304619"/>
+          </a:xfrm>
+          <a:prstGeom prst="straightConnector1">
+            <a:avLst/>
+          </a:prstGeom>
+          <a:ln w="38100">
+            <a:solidFill>
+              <a:srgbClr val="000000"/>
+            </a:solidFill>
+            <a:tailEnd type="triangle"/>
+          </a:ln>
+        </p:spPr>
+        <p:style>
+          <a:lnRef idx="1">
+            <a:schemeClr val="accent1"/>
+          </a:lnRef>
+          <a:fillRef idx="0">
+            <a:schemeClr val="accent1"/>
+          </a:fillRef>
+          <a:effectRef idx="0">
+            <a:schemeClr val="accent1"/>
+          </a:effectRef>
+          <a:fontRef idx="minor">
+            <a:schemeClr val="tx1"/>
+          </a:fontRef>
+        </p:style>
+      </p:cxnSp>
+      <p:sp>
+        <p:nvSpPr>
+          <p:cNvPr id="36" name="Rectangle: Rounded Corners 35">
+            <a:extLst>
+              <a:ext uri="{FF2B5EF4-FFF2-40B4-BE49-F238E27FC236}">
+                <a16:creationId xmlns:a16="http://schemas.microsoft.com/office/drawing/2014/main" id="{6F6B4C85-0304-4BD8-B0F2-A956350C83C0}"/>
+              </a:ext>
+            </a:extLst>
+          </p:cNvPr>
+          <p:cNvSpPr/>
+          <p:nvPr/>
+        </p:nvSpPr>
+        <p:spPr>
+          <a:xfrm>
+            <a:off x="3765774" y="5281116"/>
+            <a:ext cx="2575713" cy="540532"/>
+          </a:xfrm>
+          <a:prstGeom prst="roundRect">
+            <a:avLst/>
+          </a:prstGeom>
+        </p:spPr>
+        <p:style>
+          <a:lnRef idx="2">
+            <a:schemeClr val="accent4">
+              <a:shade val="50000"/>
+            </a:schemeClr>
+          </a:lnRef>
+          <a:fillRef idx="1">
+            <a:schemeClr val="accent4"/>
+          </a:fillRef>
+          <a:effectRef idx="0">
+            <a:schemeClr val="accent4"/>
+          </a:effectRef>
+          <a:fontRef idx="minor">
+            <a:schemeClr val="lt1"/>
+          </a:fontRef>
+        </p:style>
+        <p:txBody>
+          <a:bodyPr rtlCol="0" anchor="t"/>
+          <a:lstStyle/>
+          <a:p>
+            <a:pPr algn="ctr"/>
+            <a:r>
+              <a:rPr lang="en-CA" sz="1400" dirty="0"/>
+              <a:t>Notary’s Role RR Entry</a:t>
+            </a:r>
+            <a:br>
+              <a:rPr lang="en-CA" sz="1400" dirty="0"/>
+            </a:br>
+            <a:r>
+              <a:rPr lang="en-CA" sz="1400" dirty="0"/>
+              <a:t>did:svrn:role:6789 = NOTARY</a:t>
+            </a:r>
+          </a:p>
+        </p:txBody>
+      </p:sp>
+      <p:cxnSp>
+        <p:nvCxnSpPr>
+          <p:cNvPr id="37" name="Straight Arrow Connector 36">
+            <a:extLst>
+              <a:ext uri="{FF2B5EF4-FFF2-40B4-BE49-F238E27FC236}">
+                <a16:creationId xmlns:a16="http://schemas.microsoft.com/office/drawing/2014/main" id="{E1917A63-F4D2-4B73-81A5-32743FAF0D95}"/>
+              </a:ext>
+            </a:extLst>
+          </p:cNvPr>
+          <p:cNvCxnSpPr>
+            <a:cxnSpLocks/>
+            <a:stCxn id="20" idx="3"/>
+            <a:endCxn id="36" idx="1"/>
+          </p:cNvCxnSpPr>
+          <p:nvPr/>
+        </p:nvCxnSpPr>
+        <p:spPr>
+          <a:xfrm>
+            <a:off x="3439369" y="5246763"/>
+            <a:ext cx="326405" cy="304619"/>
+          </a:xfrm>
+          <a:prstGeom prst="straightConnector1">
+            <a:avLst/>
+          </a:prstGeom>
+          <a:ln w="38100">
+            <a:solidFill>
+              <a:srgbClr val="000000"/>
+            </a:solidFill>
+            <a:tailEnd type="triangle"/>
+          </a:ln>
+        </p:spPr>
+        <p:style>
+          <a:lnRef idx="1">
+            <a:schemeClr val="accent1"/>
+          </a:lnRef>
+          <a:fillRef idx="0">
+            <a:schemeClr val="accent1"/>
+          </a:fillRef>
+          <a:effectRef idx="0">
+            <a:schemeClr val="accent1"/>
+          </a:effectRef>
+          <a:fontRef idx="minor">
+            <a:schemeClr val="tx1"/>
+          </a:fontRef>
+        </p:style>
+      </p:cxnSp>
+      <p:sp>
+        <p:nvSpPr>
+          <p:cNvPr id="48" name="TextBox 47">
+            <a:extLst>
+              <a:ext uri="{FF2B5EF4-FFF2-40B4-BE49-F238E27FC236}">
+                <a16:creationId xmlns:a16="http://schemas.microsoft.com/office/drawing/2014/main" id="{CEF28358-3E08-4312-B650-081CE9939963}"/>
+              </a:ext>
+            </a:extLst>
+          </p:cNvPr>
+          <p:cNvSpPr txBox="1"/>
+          <p:nvPr/>
+        </p:nvSpPr>
+        <p:spPr>
+          <a:xfrm>
+            <a:off x="931988" y="5577585"/>
+            <a:ext cx="1349251" cy="307777"/>
+          </a:xfrm>
+          <a:prstGeom prst="rect">
+            <a:avLst/>
+          </a:prstGeom>
+          <a:solidFill>
+            <a:schemeClr val="bg1">
+              <a:lumMod val="95000"/>
+            </a:schemeClr>
+          </a:solidFill>
+          <a:ln>
+            <a:solidFill>
+              <a:schemeClr val="bg1">
+                <a:lumMod val="50000"/>
+              </a:schemeClr>
+            </a:solidFill>
+          </a:ln>
+        </p:spPr>
+        <p:txBody>
+          <a:bodyPr wrap="square" rtlCol="0">
+            <a:spAutoFit/>
+          </a:bodyPr>
+          <a:lstStyle/>
+          <a:p>
+            <a:pPr marL="285750" indent="-285750">
+              <a:buFontTx/>
+              <a:buChar char="-"/>
+            </a:pPr>
+            <a:r>
+              <a:rPr lang="en-CA" sz="1400" dirty="0"/>
+              <a:t>Self Signed</a:t>
+            </a:r>
+          </a:p>
+        </p:txBody>
+      </p:sp>
+      <p:sp>
+        <p:nvSpPr>
+          <p:cNvPr id="49" name="Rectangle: Rounded Corners 48">
+            <a:extLst>
+              <a:ext uri="{FF2B5EF4-FFF2-40B4-BE49-F238E27FC236}">
+                <a16:creationId xmlns:a16="http://schemas.microsoft.com/office/drawing/2014/main" id="{DD7B923A-0E55-446B-82A2-1D31B9881170}"/>
+              </a:ext>
+            </a:extLst>
+          </p:cNvPr>
+          <p:cNvSpPr/>
+          <p:nvPr/>
+        </p:nvSpPr>
+        <p:spPr>
+          <a:xfrm>
+            <a:off x="4809373" y="1495618"/>
+            <a:ext cx="2624328" cy="470976"/>
+          </a:xfrm>
+          <a:prstGeom prst="roundRect">
+            <a:avLst/>
+          </a:prstGeom>
+          <a:solidFill>
+            <a:schemeClr val="accent4">
+              <a:lumMod val="75000"/>
+            </a:schemeClr>
+          </a:solidFill>
+        </p:spPr>
+        <p:style>
+          <a:lnRef idx="2">
+            <a:schemeClr val="accent4">
+              <a:shade val="50000"/>
+            </a:schemeClr>
+          </a:lnRef>
+          <a:fillRef idx="1">
+            <a:schemeClr val="accent4"/>
+          </a:fillRef>
+          <a:effectRef idx="0">
+            <a:schemeClr val="accent4"/>
+          </a:effectRef>
+          <a:fontRef idx="minor">
+            <a:schemeClr val="lt1"/>
+          </a:fontRef>
+        </p:style>
+        <p:txBody>
+          <a:bodyPr rtlCol="0" anchor="ctr"/>
+          <a:lstStyle/>
+          <a:p>
+            <a:pPr algn="ctr"/>
+            <a:r>
+              <a:rPr lang="en-CA" sz="1400" dirty="0"/>
+              <a:t>SOVRONA’s Agent</a:t>
+            </a:r>
+          </a:p>
+          <a:p>
+            <a:pPr algn="ctr"/>
+            <a:r>
+              <a:rPr lang="en-CA" sz="1400" dirty="0"/>
+              <a:t>(Notary Services Provider)</a:t>
+            </a:r>
+          </a:p>
+        </p:txBody>
+      </p:sp>
+      <p:cxnSp>
+        <p:nvCxnSpPr>
+          <p:cNvPr id="50" name="Straight Arrow Connector 49">
+            <a:extLst>
+              <a:ext uri="{FF2B5EF4-FFF2-40B4-BE49-F238E27FC236}">
+                <a16:creationId xmlns:a16="http://schemas.microsoft.com/office/drawing/2014/main" id="{7A515F1F-C475-499F-AABC-085F7F6BF3FF}"/>
+              </a:ext>
+            </a:extLst>
+          </p:cNvPr>
+          <p:cNvCxnSpPr>
+            <a:cxnSpLocks/>
+            <a:endCxn id="49" idx="2"/>
+          </p:cNvCxnSpPr>
+          <p:nvPr/>
+        </p:nvCxnSpPr>
+        <p:spPr>
+          <a:xfrm flipV="1">
+            <a:off x="6121537" y="1966594"/>
+            <a:ext cx="0" cy="2705284"/>
+          </a:xfrm>
+          <a:prstGeom prst="straightConnector1">
+            <a:avLst/>
+          </a:prstGeom>
+          <a:ln w="38100">
+            <a:solidFill>
+              <a:srgbClr val="000000"/>
+            </a:solidFill>
+            <a:tailEnd type="triangle"/>
+          </a:ln>
+        </p:spPr>
+        <p:style>
+          <a:lnRef idx="1">
+            <a:schemeClr val="accent1"/>
+          </a:lnRef>
+          <a:fillRef idx="0">
+            <a:schemeClr val="accent1"/>
+          </a:fillRef>
+          <a:effectRef idx="0">
+            <a:schemeClr val="accent1"/>
+          </a:effectRef>
+          <a:fontRef idx="minor">
+            <a:schemeClr val="tx1"/>
+          </a:fontRef>
+        </p:style>
+      </p:cxnSp>
+      <p:sp>
+        <p:nvSpPr>
+          <p:cNvPr id="58" name="Rectangle: Rounded Corners 57">
+            <a:extLst>
+              <a:ext uri="{FF2B5EF4-FFF2-40B4-BE49-F238E27FC236}">
+                <a16:creationId xmlns:a16="http://schemas.microsoft.com/office/drawing/2014/main" id="{8084CEF3-2240-469D-B20E-51FA118372C6}"/>
+              </a:ext>
+            </a:extLst>
+          </p:cNvPr>
+          <p:cNvSpPr/>
+          <p:nvPr/>
+        </p:nvSpPr>
+        <p:spPr>
+          <a:xfrm>
+            <a:off x="7557521" y="5522798"/>
+            <a:ext cx="4469622" cy="1719249"/>
+          </a:xfrm>
+          <a:prstGeom prst="roundRect">
+            <a:avLst/>
+          </a:prstGeom>
+        </p:spPr>
+        <p:style>
+          <a:lnRef idx="2">
+            <a:schemeClr val="accent4">
+              <a:shade val="50000"/>
+            </a:schemeClr>
+          </a:lnRef>
+          <a:fillRef idx="1">
+            <a:schemeClr val="accent4"/>
+          </a:fillRef>
+          <a:effectRef idx="0">
+            <a:schemeClr val="accent4"/>
+          </a:effectRef>
+          <a:fontRef idx="minor">
+            <a:schemeClr val="lt1"/>
+          </a:fontRef>
+        </p:style>
+        <p:txBody>
+          <a:bodyPr rtlCol="0" anchor="t"/>
+          <a:lstStyle/>
+          <a:p>
+            <a:pPr algn="ctr"/>
+            <a:r>
+              <a:rPr lang="en-CA" sz="1400" dirty="0"/>
+              <a:t>Verifiable Capability Authorization (VCA) Entry</a:t>
+            </a:r>
+          </a:p>
+          <a:p>
+            <a:pPr algn="ctr"/>
+            <a:r>
+              <a:rPr lang="en-CA" sz="1400" dirty="0"/>
+              <a:t>did:svrn:vca:7890</a:t>
+            </a:r>
+          </a:p>
+          <a:p>
+            <a:pPr algn="ctr"/>
+            <a:r>
+              <a:rPr lang="en-CA" sz="1400" dirty="0" err="1"/>
+              <a:t>GrantedBy</a:t>
+            </a:r>
+            <a:r>
+              <a:rPr lang="en-CA" sz="1400" dirty="0"/>
+              <a:t>: did:svrn:person:1234</a:t>
+            </a:r>
+          </a:p>
+          <a:p>
+            <a:pPr algn="ctr"/>
+            <a:r>
+              <a:rPr lang="en-CA" sz="1400" dirty="0"/>
+              <a:t>Actor: did:svrn:notary:3456</a:t>
+            </a:r>
+          </a:p>
+          <a:p>
+            <a:pPr algn="ctr"/>
+            <a:r>
+              <a:rPr lang="en-CA" sz="1400" dirty="0"/>
+              <a:t>Target: did:svrn:sepr:2345</a:t>
+            </a:r>
+          </a:p>
+          <a:p>
+            <a:pPr algn="ctr"/>
+            <a:r>
+              <a:rPr lang="en-CA" sz="1400" dirty="0"/>
+              <a:t>Capabilities: </a:t>
+            </a:r>
+            <a:r>
+              <a:rPr lang="en-CA" sz="1400" dirty="0" err="1"/>
+              <a:t>GetCredential</a:t>
+            </a:r>
+            <a:r>
+              <a:rPr lang="en-CA" sz="1400" dirty="0"/>
+              <a:t>,</a:t>
+            </a:r>
+          </a:p>
+          <a:p>
+            <a:pPr algn="ctr"/>
+            <a:r>
+              <a:rPr lang="en-CA" sz="1400" dirty="0" err="1"/>
+              <a:t>RequestCredentialSignature</a:t>
+            </a:r>
+            <a:endParaRPr lang="en-CA" sz="1400" dirty="0"/>
+          </a:p>
+          <a:p>
+            <a:pPr algn="ctr"/>
+            <a:endParaRPr lang="en-CA" sz="1400" dirty="0"/>
+          </a:p>
+        </p:txBody>
+      </p:sp>
+      <p:sp>
+        <p:nvSpPr>
+          <p:cNvPr id="59" name="TextBox 58">
+            <a:extLst>
+              <a:ext uri="{FF2B5EF4-FFF2-40B4-BE49-F238E27FC236}">
+                <a16:creationId xmlns:a16="http://schemas.microsoft.com/office/drawing/2014/main" id="{2F79CB62-4374-47C0-912C-C5C3072DE6E8}"/>
+              </a:ext>
+            </a:extLst>
+          </p:cNvPr>
+          <p:cNvSpPr txBox="1"/>
+          <p:nvPr/>
+        </p:nvSpPr>
+        <p:spPr>
+          <a:xfrm>
+            <a:off x="6948777" y="5975416"/>
+            <a:ext cx="1349250" cy="523220"/>
+          </a:xfrm>
+          <a:prstGeom prst="rect">
+            <a:avLst/>
+          </a:prstGeom>
+          <a:solidFill>
+            <a:schemeClr val="bg1">
+              <a:lumMod val="95000"/>
+            </a:schemeClr>
+          </a:solidFill>
+          <a:ln>
+            <a:solidFill>
+              <a:schemeClr val="bg1">
+                <a:lumMod val="50000"/>
+              </a:schemeClr>
+            </a:solidFill>
+          </a:ln>
+        </p:spPr>
+        <p:txBody>
+          <a:bodyPr wrap="square" rtlCol="0">
+            <a:spAutoFit/>
+          </a:bodyPr>
+          <a:lstStyle/>
+          <a:p>
+            <a:pPr marL="285750" indent="-285750">
+              <a:buFontTx/>
+              <a:buChar char="-"/>
+            </a:pPr>
+            <a:r>
+              <a:rPr lang="en-CA" sz="1400" dirty="0"/>
+              <a:t>Self Signed</a:t>
+            </a:r>
+          </a:p>
+          <a:p>
+            <a:pPr marL="285750" indent="-285750">
+              <a:buFontTx/>
+              <a:buChar char="-"/>
+            </a:pPr>
+            <a:r>
+              <a:rPr lang="en-CA" sz="1400" dirty="0"/>
+              <a:t>Notarized</a:t>
+            </a:r>
+          </a:p>
+        </p:txBody>
+      </p:sp>
+      <p:sp>
+        <p:nvSpPr>
+          <p:cNvPr id="60" name="Rectangle: Rounded Corners 59">
+            <a:extLst>
+              <a:ext uri="{FF2B5EF4-FFF2-40B4-BE49-F238E27FC236}">
+                <a16:creationId xmlns:a16="http://schemas.microsoft.com/office/drawing/2014/main" id="{760B6FCD-796E-47AA-84B3-5D83269D3F85}"/>
+              </a:ext>
+            </a:extLst>
+          </p:cNvPr>
+          <p:cNvSpPr/>
+          <p:nvPr/>
+        </p:nvSpPr>
+        <p:spPr>
+          <a:xfrm>
+            <a:off x="8732520" y="1479627"/>
+            <a:ext cx="2624328" cy="470976"/>
+          </a:xfrm>
+          <a:prstGeom prst="roundRect">
+            <a:avLst/>
+          </a:prstGeom>
+          <a:solidFill>
+            <a:schemeClr val="accent4">
+              <a:lumMod val="75000"/>
+            </a:schemeClr>
+          </a:solidFill>
+        </p:spPr>
+        <p:style>
+          <a:lnRef idx="2">
+            <a:schemeClr val="accent4">
+              <a:shade val="50000"/>
+            </a:schemeClr>
+          </a:lnRef>
+          <a:fillRef idx="1">
+            <a:schemeClr val="accent4"/>
+          </a:fillRef>
+          <a:effectRef idx="0">
+            <a:schemeClr val="accent4"/>
+          </a:effectRef>
+          <a:fontRef idx="minor">
+            <a:schemeClr val="lt1"/>
+          </a:fontRef>
+        </p:style>
+        <p:txBody>
+          <a:bodyPr rtlCol="0" anchor="ctr"/>
+          <a:lstStyle/>
+          <a:p>
+            <a:pPr algn="ctr"/>
+            <a:r>
+              <a:rPr lang="en-CA" sz="1400" dirty="0"/>
+              <a:t>VDR Agent</a:t>
+            </a:r>
+          </a:p>
+          <a:p>
+            <a:pPr algn="ctr"/>
+            <a:r>
+              <a:rPr lang="en-CA" sz="1400" dirty="0"/>
+              <a:t>(VDR Services Agent)</a:t>
+            </a:r>
+          </a:p>
+        </p:txBody>
+      </p:sp>
+      <p:cxnSp>
+        <p:nvCxnSpPr>
+          <p:cNvPr id="61" name="Straight Arrow Connector 60">
+            <a:extLst>
+              <a:ext uri="{FF2B5EF4-FFF2-40B4-BE49-F238E27FC236}">
+                <a16:creationId xmlns:a16="http://schemas.microsoft.com/office/drawing/2014/main" id="{F4C3FB1A-584A-48D4-A73A-5DD3E4ED0884}"/>
+              </a:ext>
+            </a:extLst>
+          </p:cNvPr>
+          <p:cNvCxnSpPr>
+            <a:cxnSpLocks/>
+            <a:endCxn id="60" idx="2"/>
+          </p:cNvCxnSpPr>
+          <p:nvPr/>
+        </p:nvCxnSpPr>
+        <p:spPr>
+          <a:xfrm flipV="1">
+            <a:off x="10044684" y="1950603"/>
+            <a:ext cx="0" cy="280533"/>
+          </a:xfrm>
+          <a:prstGeom prst="straightConnector1">
+            <a:avLst/>
+          </a:prstGeom>
+          <a:ln w="38100">
+            <a:solidFill>
+              <a:srgbClr val="000000"/>
+            </a:solidFill>
+            <a:headEnd type="triangle" w="med" len="med"/>
+            <a:tailEnd type="triangle" w="med" len="med"/>
+          </a:ln>
+        </p:spPr>
+        <p:style>
+          <a:lnRef idx="1">
+            <a:schemeClr val="accent1"/>
+          </a:lnRef>
+          <a:fillRef idx="0">
+            <a:schemeClr val="accent1"/>
+          </a:fillRef>
+          <a:effectRef idx="0">
+            <a:schemeClr val="accent1"/>
+          </a:effectRef>
+          <a:fontRef idx="minor">
+            <a:schemeClr val="tx1"/>
+          </a:fontRef>
+        </p:style>
+      </p:cxnSp>
+      <p:cxnSp>
+        <p:nvCxnSpPr>
+          <p:cNvPr id="67" name="Straight Arrow Connector 66">
+            <a:extLst>
+              <a:ext uri="{FF2B5EF4-FFF2-40B4-BE49-F238E27FC236}">
+                <a16:creationId xmlns:a16="http://schemas.microsoft.com/office/drawing/2014/main" id="{150F34D2-2CA3-4898-AB89-D0C015F73811}"/>
+              </a:ext>
+            </a:extLst>
+          </p:cNvPr>
+          <p:cNvCxnSpPr>
+            <a:cxnSpLocks/>
+            <a:stCxn id="4" idx="0"/>
+            <a:endCxn id="2" idx="2"/>
+          </p:cNvCxnSpPr>
+          <p:nvPr/>
+        </p:nvCxnSpPr>
+        <p:spPr>
+          <a:xfrm flipV="1">
+            <a:off x="2381823" y="469950"/>
+            <a:ext cx="0" cy="477069"/>
+          </a:xfrm>
+          <a:prstGeom prst="straightConnector1">
+            <a:avLst/>
+          </a:prstGeom>
+          <a:ln w="38100">
+            <a:solidFill>
+              <a:srgbClr val="000000"/>
+            </a:solidFill>
+            <a:tailEnd type="triangle"/>
+          </a:ln>
+        </p:spPr>
+        <p:style>
+          <a:lnRef idx="1">
+            <a:schemeClr val="accent1"/>
+          </a:lnRef>
+          <a:fillRef idx="0">
+            <a:schemeClr val="accent1"/>
+          </a:fillRef>
+          <a:effectRef idx="0">
+            <a:schemeClr val="accent1"/>
+          </a:effectRef>
+          <a:fontRef idx="minor">
+            <a:schemeClr val="tx1"/>
+          </a:fontRef>
+        </p:style>
+      </p:cxnSp>
+      <p:sp>
+        <p:nvSpPr>
+          <p:cNvPr id="76" name="Rectangle: Rounded Corners 75">
+            <a:extLst>
+              <a:ext uri="{FF2B5EF4-FFF2-40B4-BE49-F238E27FC236}">
+                <a16:creationId xmlns:a16="http://schemas.microsoft.com/office/drawing/2014/main" id="{3A09D5EB-20D5-48B2-9DA1-37ACA95D8C47}"/>
+              </a:ext>
+            </a:extLst>
+          </p:cNvPr>
+          <p:cNvSpPr/>
+          <p:nvPr/>
+        </p:nvSpPr>
+        <p:spPr>
+          <a:xfrm>
+            <a:off x="7557520" y="3566765"/>
+            <a:ext cx="4469623" cy="1828015"/>
+          </a:xfrm>
+          <a:prstGeom prst="roundRect">
+            <a:avLst/>
+          </a:prstGeom>
+        </p:spPr>
+        <p:style>
+          <a:lnRef idx="2">
+            <a:schemeClr val="accent4">
+              <a:shade val="50000"/>
+            </a:schemeClr>
+          </a:lnRef>
+          <a:fillRef idx="1">
+            <a:schemeClr val="accent4"/>
+          </a:fillRef>
+          <a:effectRef idx="0">
+            <a:schemeClr val="accent4"/>
+          </a:effectRef>
+          <a:fontRef idx="minor">
+            <a:schemeClr val="lt1"/>
+          </a:fontRef>
+        </p:style>
+        <p:txBody>
+          <a:bodyPr rtlCol="0" anchor="t"/>
+          <a:lstStyle/>
+          <a:p>
+            <a:pPr algn="ctr"/>
+            <a:r>
+              <a:rPr lang="en-CA" sz="1400" dirty="0"/>
+              <a:t>Master Verifiable Capability Authorization (MVCA) Entry</a:t>
+            </a:r>
+          </a:p>
+          <a:p>
+            <a:pPr algn="ctr"/>
+            <a:r>
+              <a:rPr lang="en-CA" sz="1400" dirty="0"/>
+              <a:t>did:svrn:vca:8901</a:t>
+            </a:r>
+          </a:p>
+          <a:p>
+            <a:pPr algn="ctr"/>
+            <a:r>
+              <a:rPr lang="en-CA" sz="1400" dirty="0" err="1"/>
+              <a:t>GrantedBy</a:t>
+            </a:r>
+            <a:r>
+              <a:rPr lang="en-CA" sz="1400" dirty="0"/>
+              <a:t>: did:svrn:steward:9012</a:t>
+            </a:r>
+          </a:p>
+          <a:p>
+            <a:pPr algn="ctr"/>
+            <a:r>
+              <a:rPr lang="en-CA" sz="1400" dirty="0"/>
+              <a:t>Actor: did:svrn:person:1234</a:t>
+            </a:r>
+          </a:p>
+          <a:p>
+            <a:pPr algn="ctr"/>
+            <a:r>
+              <a:rPr lang="en-CA" sz="1400" dirty="0"/>
+              <a:t>Target: did:svrn:sepr:2345</a:t>
+            </a:r>
+          </a:p>
+          <a:p>
+            <a:pPr algn="ctr"/>
+            <a:r>
+              <a:rPr lang="en-CA" sz="1400" dirty="0"/>
+              <a:t>Capabilities: </a:t>
+            </a:r>
+            <a:r>
+              <a:rPr lang="en-CA" sz="1400" dirty="0" err="1"/>
+              <a:t>CreateLocalCredential</a:t>
+            </a:r>
+            <a:r>
+              <a:rPr lang="en-CA" sz="1400" dirty="0"/>
+              <a:t>, </a:t>
+            </a:r>
+            <a:r>
+              <a:rPr lang="en-CA" sz="1400" dirty="0" err="1"/>
+              <a:t>GetCredential</a:t>
+            </a:r>
+            <a:r>
+              <a:rPr lang="en-CA" sz="1400" dirty="0"/>
+              <a:t>,</a:t>
+            </a:r>
+          </a:p>
+          <a:p>
+            <a:pPr algn="ctr"/>
+            <a:r>
+              <a:rPr lang="en-CA" sz="1400" dirty="0" err="1"/>
+              <a:t>SetCredentialTrustLevel</a:t>
+            </a:r>
+            <a:endParaRPr lang="en-CA" sz="1400" dirty="0"/>
+          </a:p>
+          <a:p>
+            <a:pPr algn="ctr"/>
+            <a:endParaRPr lang="en-CA" sz="1400" dirty="0"/>
+          </a:p>
+        </p:txBody>
+      </p:sp>
+      <p:sp>
+        <p:nvSpPr>
+          <p:cNvPr id="77" name="TextBox 76">
+            <a:extLst>
+              <a:ext uri="{FF2B5EF4-FFF2-40B4-BE49-F238E27FC236}">
+                <a16:creationId xmlns:a16="http://schemas.microsoft.com/office/drawing/2014/main" id="{927040D9-6BF7-41A3-982F-0FC0A1D5C72E}"/>
+              </a:ext>
+            </a:extLst>
+          </p:cNvPr>
+          <p:cNvSpPr txBox="1"/>
+          <p:nvPr/>
+        </p:nvSpPr>
+        <p:spPr>
+          <a:xfrm>
+            <a:off x="6948777" y="4113705"/>
+            <a:ext cx="1349250" cy="307777"/>
+          </a:xfrm>
+          <a:prstGeom prst="rect">
+            <a:avLst/>
+          </a:prstGeom>
+          <a:solidFill>
+            <a:schemeClr val="bg1">
+              <a:lumMod val="95000"/>
+            </a:schemeClr>
+          </a:solidFill>
+          <a:ln>
+            <a:solidFill>
+              <a:schemeClr val="bg1">
+                <a:lumMod val="50000"/>
+              </a:schemeClr>
+            </a:solidFill>
+          </a:ln>
+        </p:spPr>
+        <p:txBody>
+          <a:bodyPr wrap="square" rtlCol="0">
+            <a:spAutoFit/>
+          </a:bodyPr>
+          <a:lstStyle/>
+          <a:p>
+            <a:pPr marL="285750" indent="-285750">
+              <a:buFontTx/>
+              <a:buChar char="-"/>
+            </a:pPr>
+            <a:r>
+              <a:rPr lang="en-CA" sz="1400" dirty="0"/>
+              <a:t>Notarized</a:t>
+            </a:r>
+          </a:p>
+        </p:txBody>
+      </p:sp>
+      <p:sp>
+        <p:nvSpPr>
+          <p:cNvPr id="85" name="Rectangle: Rounded Corners 84">
+            <a:extLst>
+              <a:ext uri="{FF2B5EF4-FFF2-40B4-BE49-F238E27FC236}">
+                <a16:creationId xmlns:a16="http://schemas.microsoft.com/office/drawing/2014/main" id="{4FA16736-298B-4F15-ABAC-ADC2EF7D43E1}"/>
+              </a:ext>
+            </a:extLst>
+          </p:cNvPr>
+          <p:cNvSpPr/>
+          <p:nvPr/>
+        </p:nvSpPr>
+        <p:spPr>
+          <a:xfrm>
+            <a:off x="1605887" y="6111740"/>
+            <a:ext cx="2223593" cy="1149771"/>
+          </a:xfrm>
+          <a:prstGeom prst="roundRect">
+            <a:avLst/>
+          </a:prstGeom>
+        </p:spPr>
+        <p:style>
+          <a:lnRef idx="2">
+            <a:schemeClr val="accent4">
+              <a:shade val="50000"/>
+            </a:schemeClr>
+          </a:lnRef>
+          <a:fillRef idx="1">
+            <a:schemeClr val="accent4"/>
+          </a:fillRef>
+          <a:effectRef idx="0">
+            <a:schemeClr val="accent4"/>
+          </a:effectRef>
+          <a:fontRef idx="minor">
+            <a:schemeClr val="lt1"/>
+          </a:fontRef>
+        </p:style>
+        <p:txBody>
+          <a:bodyPr rtlCol="0" anchor="t"/>
+          <a:lstStyle/>
+          <a:p>
+            <a:pPr algn="ctr"/>
+            <a:r>
+              <a:rPr lang="en-CA" sz="1400" dirty="0"/>
+              <a:t>Steward’s UIR Entry</a:t>
+            </a:r>
+          </a:p>
+          <a:p>
+            <a:pPr algn="ctr"/>
+            <a:r>
+              <a:rPr lang="en-CA" sz="1400" dirty="0"/>
+              <a:t>(DID Doc)</a:t>
+            </a:r>
+          </a:p>
+          <a:p>
+            <a:pPr algn="ctr"/>
+            <a:r>
+              <a:rPr lang="en-CA" sz="1400" dirty="0"/>
+              <a:t>did:svrn:steward:0123</a:t>
+            </a:r>
+          </a:p>
+        </p:txBody>
+      </p:sp>
+      <p:sp>
+        <p:nvSpPr>
+          <p:cNvPr id="86" name="Rectangle: Rounded Corners 85">
+            <a:extLst>
+              <a:ext uri="{FF2B5EF4-FFF2-40B4-BE49-F238E27FC236}">
+                <a16:creationId xmlns:a16="http://schemas.microsoft.com/office/drawing/2014/main" id="{D9D25A97-396E-4032-9415-9D3C59385A30}"/>
+              </a:ext>
+            </a:extLst>
+          </p:cNvPr>
+          <p:cNvSpPr/>
+          <p:nvPr/>
+        </p:nvSpPr>
+        <p:spPr>
+          <a:xfrm>
+            <a:off x="4155886" y="6111741"/>
+            <a:ext cx="2575712" cy="540533"/>
+          </a:xfrm>
+          <a:prstGeom prst="roundRect">
+            <a:avLst/>
+          </a:prstGeom>
+        </p:spPr>
+        <p:style>
+          <a:lnRef idx="2">
+            <a:schemeClr val="accent4">
+              <a:shade val="50000"/>
+            </a:schemeClr>
+          </a:lnRef>
+          <a:fillRef idx="1">
+            <a:schemeClr val="accent4"/>
+          </a:fillRef>
+          <a:effectRef idx="0">
+            <a:schemeClr val="accent4"/>
+          </a:effectRef>
+          <a:fontRef idx="minor">
+            <a:schemeClr val="lt1"/>
+          </a:fontRef>
+        </p:style>
+        <p:txBody>
+          <a:bodyPr rtlCol="0" anchor="t"/>
+          <a:lstStyle/>
+          <a:p>
+            <a:pPr algn="ctr"/>
+            <a:r>
+              <a:rPr lang="en-CA" sz="1400" dirty="0"/>
+              <a:t>Steward Agent SEPR Entry</a:t>
+            </a:r>
+          </a:p>
+          <a:p>
+            <a:pPr algn="ctr"/>
+            <a:r>
+              <a:rPr lang="en-CA" sz="1400" dirty="0"/>
+              <a:t>did:svrn:sepr:1357</a:t>
+            </a:r>
+          </a:p>
+        </p:txBody>
+      </p:sp>
+      <p:cxnSp>
+        <p:nvCxnSpPr>
+          <p:cNvPr id="87" name="Straight Arrow Connector 86">
+            <a:extLst>
+              <a:ext uri="{FF2B5EF4-FFF2-40B4-BE49-F238E27FC236}">
+                <a16:creationId xmlns:a16="http://schemas.microsoft.com/office/drawing/2014/main" id="{3B05FDE4-5211-42B6-B5DE-3DFBDF88354E}"/>
+              </a:ext>
+            </a:extLst>
+          </p:cNvPr>
+          <p:cNvCxnSpPr>
+            <a:cxnSpLocks/>
+            <a:stCxn id="85" idx="3"/>
+            <a:endCxn id="86" idx="1"/>
+          </p:cNvCxnSpPr>
+          <p:nvPr/>
+        </p:nvCxnSpPr>
+        <p:spPr>
+          <a:xfrm flipV="1">
+            <a:off x="3829480" y="6382008"/>
+            <a:ext cx="326406" cy="304618"/>
+          </a:xfrm>
+          <a:prstGeom prst="straightConnector1">
+            <a:avLst/>
+          </a:prstGeom>
+          <a:ln w="38100">
+            <a:solidFill>
+              <a:srgbClr val="000000"/>
+            </a:solidFill>
+            <a:tailEnd type="triangle"/>
+          </a:ln>
+        </p:spPr>
+        <p:style>
+          <a:lnRef idx="1">
+            <a:schemeClr val="accent1"/>
+          </a:lnRef>
+          <a:fillRef idx="0">
+            <a:schemeClr val="accent1"/>
+          </a:fillRef>
+          <a:effectRef idx="0">
+            <a:schemeClr val="accent1"/>
+          </a:effectRef>
+          <a:fontRef idx="minor">
+            <a:schemeClr val="tx1"/>
+          </a:fontRef>
+        </p:style>
+      </p:cxnSp>
+      <p:sp>
+        <p:nvSpPr>
+          <p:cNvPr id="88" name="Rectangle: Rounded Corners 87">
+            <a:extLst>
+              <a:ext uri="{FF2B5EF4-FFF2-40B4-BE49-F238E27FC236}">
+                <a16:creationId xmlns:a16="http://schemas.microsoft.com/office/drawing/2014/main" id="{FB1037A8-A0B6-4027-BEF3-7AAD36CA14A2}"/>
+              </a:ext>
+            </a:extLst>
+          </p:cNvPr>
+          <p:cNvSpPr/>
+          <p:nvPr/>
+        </p:nvSpPr>
+        <p:spPr>
+          <a:xfrm>
+            <a:off x="4155885" y="6720979"/>
+            <a:ext cx="2575713" cy="540532"/>
+          </a:xfrm>
+          <a:prstGeom prst="roundRect">
+            <a:avLst/>
+          </a:prstGeom>
+        </p:spPr>
+        <p:style>
+          <a:lnRef idx="2">
+            <a:schemeClr val="accent4">
+              <a:shade val="50000"/>
+            </a:schemeClr>
+          </a:lnRef>
+          <a:fillRef idx="1">
+            <a:schemeClr val="accent4"/>
+          </a:fillRef>
+          <a:effectRef idx="0">
+            <a:schemeClr val="accent4"/>
+          </a:effectRef>
+          <a:fontRef idx="minor">
+            <a:schemeClr val="lt1"/>
+          </a:fontRef>
+        </p:style>
+        <p:txBody>
+          <a:bodyPr rtlCol="0" anchor="t"/>
+          <a:lstStyle/>
+          <a:p>
+            <a:pPr algn="ctr"/>
+            <a:r>
+              <a:rPr lang="en-CA" sz="1400" dirty="0"/>
+              <a:t>Steward’s Role RR Entry</a:t>
+            </a:r>
+            <a:br>
+              <a:rPr lang="en-CA" sz="1400" dirty="0"/>
+            </a:br>
+            <a:r>
+              <a:rPr lang="en-CA" sz="1400" dirty="0"/>
+              <a:t>did:svrn:role:3579 = STEWARD</a:t>
+            </a:r>
+          </a:p>
+        </p:txBody>
+      </p:sp>
+      <p:cxnSp>
+        <p:nvCxnSpPr>
+          <p:cNvPr id="89" name="Straight Arrow Connector 88">
+            <a:extLst>
+              <a:ext uri="{FF2B5EF4-FFF2-40B4-BE49-F238E27FC236}">
+                <a16:creationId xmlns:a16="http://schemas.microsoft.com/office/drawing/2014/main" id="{6727D9EE-B89B-4642-8C8E-DCCD87DB5BC1}"/>
+              </a:ext>
+            </a:extLst>
+          </p:cNvPr>
+          <p:cNvCxnSpPr>
+            <a:cxnSpLocks/>
+            <a:stCxn id="85" idx="3"/>
+            <a:endCxn id="88" idx="1"/>
+          </p:cNvCxnSpPr>
+          <p:nvPr/>
+        </p:nvCxnSpPr>
+        <p:spPr>
+          <a:xfrm>
+            <a:off x="3829480" y="6686626"/>
+            <a:ext cx="326405" cy="304619"/>
+          </a:xfrm>
+          <a:prstGeom prst="straightConnector1">
+            <a:avLst/>
+          </a:prstGeom>
+          <a:ln w="38100">
+            <a:solidFill>
+              <a:srgbClr val="000000"/>
+            </a:solidFill>
+            <a:tailEnd type="triangle"/>
+          </a:ln>
+        </p:spPr>
+        <p:style>
+          <a:lnRef idx="1">
+            <a:schemeClr val="accent1"/>
+          </a:lnRef>
+          <a:fillRef idx="0">
+            <a:schemeClr val="accent1"/>
+          </a:fillRef>
+          <a:effectRef idx="0">
+            <a:schemeClr val="accent1"/>
+          </a:effectRef>
+          <a:fontRef idx="minor">
+            <a:schemeClr val="tx1"/>
+          </a:fontRef>
+        </p:style>
+      </p:cxnSp>
+      <p:sp>
+        <p:nvSpPr>
+          <p:cNvPr id="90" name="TextBox 89">
+            <a:extLst>
+              <a:ext uri="{FF2B5EF4-FFF2-40B4-BE49-F238E27FC236}">
+                <a16:creationId xmlns:a16="http://schemas.microsoft.com/office/drawing/2014/main" id="{2EA777CB-11CF-413A-A18F-4F7862667AC1}"/>
+              </a:ext>
+            </a:extLst>
+          </p:cNvPr>
+          <p:cNvSpPr txBox="1"/>
+          <p:nvPr/>
+        </p:nvSpPr>
+        <p:spPr>
+          <a:xfrm>
+            <a:off x="1322099" y="7017448"/>
+            <a:ext cx="1349251" cy="307777"/>
+          </a:xfrm>
+          <a:prstGeom prst="rect">
+            <a:avLst/>
+          </a:prstGeom>
+          <a:solidFill>
+            <a:schemeClr val="bg1">
+              <a:lumMod val="95000"/>
+            </a:schemeClr>
+          </a:solidFill>
+          <a:ln>
+            <a:solidFill>
+              <a:schemeClr val="bg1">
+                <a:lumMod val="50000"/>
+              </a:schemeClr>
+            </a:solidFill>
+          </a:ln>
+        </p:spPr>
+        <p:txBody>
+          <a:bodyPr wrap="square" rtlCol="0">
+            <a:spAutoFit/>
+          </a:bodyPr>
+          <a:lstStyle/>
+          <a:p>
+            <a:pPr marL="285750" indent="-285750">
+              <a:buFontTx/>
+              <a:buChar char="-"/>
+            </a:pPr>
+            <a:r>
+              <a:rPr lang="en-CA" sz="1400" dirty="0"/>
+              <a:t>Self Signed</a:t>
+            </a:r>
+          </a:p>
+        </p:txBody>
+      </p:sp>
+      <p:sp>
+        <p:nvSpPr>
+          <p:cNvPr id="91" name="Rectangle: Rounded Corners 90">
+            <a:extLst>
+              <a:ext uri="{FF2B5EF4-FFF2-40B4-BE49-F238E27FC236}">
+                <a16:creationId xmlns:a16="http://schemas.microsoft.com/office/drawing/2014/main" id="{D64109FB-DD08-4E76-A991-8E6C626DDF82}"/>
+              </a:ext>
+            </a:extLst>
+          </p:cNvPr>
+          <p:cNvSpPr/>
+          <p:nvPr/>
+        </p:nvSpPr>
+        <p:spPr>
+          <a:xfrm>
+            <a:off x="4809373" y="530397"/>
+            <a:ext cx="2624326" cy="470976"/>
+          </a:xfrm>
+          <a:prstGeom prst="roundRect">
+            <a:avLst/>
+          </a:prstGeom>
+        </p:spPr>
+        <p:style>
+          <a:lnRef idx="2">
+            <a:schemeClr val="accent5">
+              <a:shade val="50000"/>
+            </a:schemeClr>
+          </a:lnRef>
+          <a:fillRef idx="1">
+            <a:schemeClr val="accent5"/>
+          </a:fillRef>
+          <a:effectRef idx="0">
+            <a:schemeClr val="accent5"/>
+          </a:effectRef>
+          <a:fontRef idx="minor">
+            <a:schemeClr val="lt1"/>
+          </a:fontRef>
+        </p:style>
+        <p:txBody>
+          <a:bodyPr rtlCol="0" anchor="ctr"/>
+          <a:lstStyle/>
+          <a:p>
+            <a:pPr algn="ctr"/>
+            <a:r>
+              <a:rPr lang="en-CA" sz="1400" dirty="0"/>
+              <a:t>SOVRONA’s Wallet</a:t>
+            </a:r>
+            <a:endParaRPr lang="en-CA" sz="1200" dirty="0"/>
+          </a:p>
+        </p:txBody>
+      </p:sp>
+      <p:cxnSp>
+        <p:nvCxnSpPr>
+          <p:cNvPr id="92" name="Straight Arrow Connector 91">
+            <a:extLst>
+              <a:ext uri="{FF2B5EF4-FFF2-40B4-BE49-F238E27FC236}">
+                <a16:creationId xmlns:a16="http://schemas.microsoft.com/office/drawing/2014/main" id="{8962DA4B-8B72-4053-87CC-D067AC9EE236}"/>
+              </a:ext>
+            </a:extLst>
+          </p:cNvPr>
+          <p:cNvCxnSpPr>
+            <a:cxnSpLocks/>
+          </p:cNvCxnSpPr>
+          <p:nvPr/>
+        </p:nvCxnSpPr>
+        <p:spPr>
+          <a:xfrm flipV="1">
+            <a:off x="6121537" y="1018549"/>
+            <a:ext cx="0" cy="477069"/>
+          </a:xfrm>
+          <a:prstGeom prst="straightConnector1">
+            <a:avLst/>
+          </a:prstGeom>
+          <a:ln w="38100">
+            <a:solidFill>
+              <a:srgbClr val="000000"/>
+            </a:solidFill>
+            <a:tailEnd type="triangle"/>
+          </a:ln>
+        </p:spPr>
+        <p:style>
+          <a:lnRef idx="1">
+            <a:schemeClr val="accent1"/>
+          </a:lnRef>
+          <a:fillRef idx="0">
+            <a:schemeClr val="accent1"/>
+          </a:fillRef>
+          <a:effectRef idx="0">
+            <a:schemeClr val="accent1"/>
+          </a:effectRef>
+          <a:fontRef idx="minor">
+            <a:schemeClr val="tx1"/>
+          </a:fontRef>
+        </p:style>
+      </p:cxnSp>
+      <p:cxnSp>
+        <p:nvCxnSpPr>
+          <p:cNvPr id="93" name="Straight Arrow Connector 92">
+            <a:extLst>
+              <a:ext uri="{FF2B5EF4-FFF2-40B4-BE49-F238E27FC236}">
+                <a16:creationId xmlns:a16="http://schemas.microsoft.com/office/drawing/2014/main" id="{6DC92B4E-4809-45C8-BB1D-C864E744EBA6}"/>
+              </a:ext>
+            </a:extLst>
+          </p:cNvPr>
+          <p:cNvCxnSpPr>
+            <a:cxnSpLocks/>
+          </p:cNvCxnSpPr>
+          <p:nvPr/>
+        </p:nvCxnSpPr>
+        <p:spPr>
+          <a:xfrm flipV="1">
+            <a:off x="10044684" y="1018549"/>
+            <a:ext cx="0" cy="477069"/>
+          </a:xfrm>
+          <a:prstGeom prst="straightConnector1">
+            <a:avLst/>
+          </a:prstGeom>
+          <a:ln w="38100">
+            <a:solidFill>
+              <a:srgbClr val="000000"/>
+            </a:solidFill>
+            <a:tailEnd type="triangle"/>
+          </a:ln>
+        </p:spPr>
+        <p:style>
+          <a:lnRef idx="1">
+            <a:schemeClr val="accent1"/>
+          </a:lnRef>
+          <a:fillRef idx="0">
+            <a:schemeClr val="accent1"/>
+          </a:fillRef>
+          <a:effectRef idx="0">
+            <a:schemeClr val="accent1"/>
+          </a:effectRef>
+          <a:fontRef idx="minor">
+            <a:schemeClr val="tx1"/>
+          </a:fontRef>
+        </p:style>
+      </p:cxnSp>
+      <p:sp>
+        <p:nvSpPr>
+          <p:cNvPr id="94" name="Rectangle: Rounded Corners 93">
+            <a:extLst>
+              <a:ext uri="{FF2B5EF4-FFF2-40B4-BE49-F238E27FC236}">
+                <a16:creationId xmlns:a16="http://schemas.microsoft.com/office/drawing/2014/main" id="{B8B9A554-709A-486A-99A9-DFC753C83561}"/>
+              </a:ext>
+            </a:extLst>
+          </p:cNvPr>
+          <p:cNvSpPr/>
+          <p:nvPr/>
+        </p:nvSpPr>
+        <p:spPr>
+          <a:xfrm>
+            <a:off x="8732520" y="530397"/>
+            <a:ext cx="2624326" cy="470976"/>
+          </a:xfrm>
+          <a:prstGeom prst="roundRect">
+            <a:avLst/>
+          </a:prstGeom>
+        </p:spPr>
+        <p:style>
+          <a:lnRef idx="2">
+            <a:schemeClr val="accent5">
+              <a:shade val="50000"/>
+            </a:schemeClr>
+          </a:lnRef>
+          <a:fillRef idx="1">
+            <a:schemeClr val="accent5"/>
+          </a:fillRef>
+          <a:effectRef idx="0">
+            <a:schemeClr val="accent5"/>
+          </a:effectRef>
+          <a:fontRef idx="minor">
+            <a:schemeClr val="lt1"/>
+          </a:fontRef>
+        </p:style>
+        <p:txBody>
+          <a:bodyPr rtlCol="0" anchor="ctr"/>
+          <a:lstStyle/>
+          <a:p>
+            <a:pPr algn="ctr"/>
+            <a:r>
+              <a:rPr lang="en-CA" sz="1400" dirty="0"/>
+              <a:t>VDR Agent’s Wallet</a:t>
+            </a:r>
+            <a:endParaRPr lang="en-CA" sz="1200" dirty="0"/>
+          </a:p>
+        </p:txBody>
+      </p:sp>
+      <p:sp>
+        <p:nvSpPr>
+          <p:cNvPr id="95" name="TextBox 94">
+            <a:extLst>
+              <a:ext uri="{FF2B5EF4-FFF2-40B4-BE49-F238E27FC236}">
+                <a16:creationId xmlns:a16="http://schemas.microsoft.com/office/drawing/2014/main" id="{B1886DEE-E650-4CD7-BBA0-62D1AB24E959}"/>
+              </a:ext>
+            </a:extLst>
+          </p:cNvPr>
+          <p:cNvSpPr txBox="1"/>
+          <p:nvPr/>
+        </p:nvSpPr>
+        <p:spPr>
+          <a:xfrm>
+            <a:off x="6341488" y="2513129"/>
+            <a:ext cx="5685654" cy="954107"/>
+          </a:xfrm>
+          <a:prstGeom prst="rect">
+            <a:avLst/>
+          </a:prstGeom>
+          <a:solidFill>
+            <a:schemeClr val="bg1">
+              <a:lumMod val="95000"/>
+            </a:schemeClr>
+          </a:solidFill>
+          <a:ln>
+            <a:solidFill>
+              <a:schemeClr val="bg1">
+                <a:lumMod val="50000"/>
+              </a:schemeClr>
+            </a:solidFill>
+          </a:ln>
+        </p:spPr>
+        <p:txBody>
+          <a:bodyPr wrap="square" rtlCol="0">
+            <a:spAutoFit/>
+          </a:bodyPr>
+          <a:lstStyle/>
+          <a:p>
+            <a:r>
+              <a:rPr lang="en-CA" sz="1400" dirty="0"/>
+              <a:t>A Wallet is a </a:t>
+            </a:r>
+            <a:r>
+              <a:rPr lang="en-CA" sz="1400" i="1" dirty="0"/>
+              <a:t>digital store for credentials, keys, and master secrets </a:t>
+            </a:r>
+            <a:r>
+              <a:rPr lang="en-CA" sz="1400" dirty="0"/>
+              <a:t>that is </a:t>
+            </a:r>
+            <a:r>
+              <a:rPr lang="en-CA" sz="1400" i="1" dirty="0"/>
+              <a:t>local, secure, and personal</a:t>
+            </a:r>
+            <a:r>
+              <a:rPr lang="en-CA" sz="1400" dirty="0"/>
+              <a:t> to each and every Agent. It resides on the same node/node cluster an Agent’s Service Endpoint is hosted on. A Wallet is a specialization of a Generic Credential Repository.</a:t>
+            </a:r>
+          </a:p>
+        </p:txBody>
+      </p:sp>
+      <p:cxnSp>
+        <p:nvCxnSpPr>
+          <p:cNvPr id="110" name="Connector: Elbow 109">
+            <a:extLst>
+              <a:ext uri="{FF2B5EF4-FFF2-40B4-BE49-F238E27FC236}">
+                <a16:creationId xmlns:a16="http://schemas.microsoft.com/office/drawing/2014/main" id="{DAFDFB78-B01F-4097-BF65-12396FEC9E03}"/>
+              </a:ext>
+            </a:extLst>
+          </p:cNvPr>
+          <p:cNvCxnSpPr>
+            <a:cxnSpLocks/>
+            <a:stCxn id="49" idx="1"/>
+            <a:endCxn id="4" idx="3"/>
+          </p:cNvCxnSpPr>
+          <p:nvPr/>
+        </p:nvCxnSpPr>
+        <p:spPr>
+          <a:xfrm rot="10800000">
+            <a:off x="4279389" y="1182508"/>
+            <a:ext cx="529985" cy="548599"/>
+          </a:xfrm>
+          <a:prstGeom prst="bentConnector3">
+            <a:avLst>
+              <a:gd name="adj1" fmla="val 50000"/>
+            </a:avLst>
+          </a:prstGeom>
+          <a:ln w="38100">
+            <a:tailEnd type="triangle"/>
+          </a:ln>
+        </p:spPr>
+        <p:style>
+          <a:lnRef idx="1">
+            <a:schemeClr val="accent1"/>
+          </a:lnRef>
+          <a:fillRef idx="0">
+            <a:schemeClr val="accent1"/>
+          </a:fillRef>
+          <a:effectRef idx="0">
+            <a:schemeClr val="accent1"/>
+          </a:effectRef>
+          <a:fontRef idx="minor">
+            <a:schemeClr val="tx1"/>
+          </a:fontRef>
+        </p:style>
+      </p:cxnSp>
+      <p:sp>
+        <p:nvSpPr>
+          <p:cNvPr id="115" name="TextBox 114">
+            <a:extLst>
+              <a:ext uri="{FF2B5EF4-FFF2-40B4-BE49-F238E27FC236}">
+                <a16:creationId xmlns:a16="http://schemas.microsoft.com/office/drawing/2014/main" id="{33B69404-4678-4FAB-991C-2E57533496CF}"/>
+              </a:ext>
+            </a:extLst>
+          </p:cNvPr>
+          <p:cNvSpPr txBox="1"/>
+          <p:nvPr/>
+        </p:nvSpPr>
+        <p:spPr>
+          <a:xfrm>
+            <a:off x="4543817" y="1170039"/>
+            <a:ext cx="1198983" cy="338554"/>
+          </a:xfrm>
+          <a:prstGeom prst="rect">
+            <a:avLst/>
+          </a:prstGeom>
+          <a:noFill/>
+        </p:spPr>
+        <p:txBody>
+          <a:bodyPr wrap="square" rtlCol="0">
+            <a:spAutoFit/>
+          </a:bodyPr>
+          <a:lstStyle/>
+          <a:p>
+            <a:r>
+              <a:rPr lang="en-CA" sz="1600" dirty="0"/>
+              <a:t>[VCA UDID]</a:t>
+            </a:r>
+          </a:p>
+        </p:txBody>
+      </p:sp>
+      <p:sp>
+        <p:nvSpPr>
+          <p:cNvPr id="123" name="TextBox 122">
+            <a:extLst>
+              <a:ext uri="{FF2B5EF4-FFF2-40B4-BE49-F238E27FC236}">
+                <a16:creationId xmlns:a16="http://schemas.microsoft.com/office/drawing/2014/main" id="{F41F6608-A196-4215-A831-82CD11933B33}"/>
+              </a:ext>
+            </a:extLst>
+          </p:cNvPr>
+          <p:cNvSpPr txBox="1"/>
+          <p:nvPr/>
+        </p:nvSpPr>
+        <p:spPr>
+          <a:xfrm>
+            <a:off x="484256" y="1001373"/>
+            <a:ext cx="1335399" cy="307777"/>
+          </a:xfrm>
+          <a:prstGeom prst="rect">
+            <a:avLst/>
+          </a:prstGeom>
+          <a:noFill/>
+        </p:spPr>
+        <p:txBody>
+          <a:bodyPr wrap="square" rtlCol="0">
+            <a:spAutoFit/>
+          </a:bodyPr>
+          <a:lstStyle/>
+          <a:p>
+            <a:r>
+              <a:rPr lang="en-CA" sz="1400" dirty="0"/>
+              <a:t>[MVCA UDID]</a:t>
+            </a:r>
+          </a:p>
+        </p:txBody>
+      </p:sp>
+      <p:cxnSp>
+        <p:nvCxnSpPr>
+          <p:cNvPr id="125" name="Straight Connector 124">
+            <a:extLst>
+              <a:ext uri="{FF2B5EF4-FFF2-40B4-BE49-F238E27FC236}">
+                <a16:creationId xmlns:a16="http://schemas.microsoft.com/office/drawing/2014/main" id="{32D105F3-1882-46BE-BC0E-C7550C26A2D4}"/>
+              </a:ext>
+            </a:extLst>
+          </p:cNvPr>
+          <p:cNvCxnSpPr>
+            <a:cxnSpLocks/>
+            <a:endCxn id="126" idx="3"/>
+          </p:cNvCxnSpPr>
+          <p:nvPr/>
+        </p:nvCxnSpPr>
+        <p:spPr>
+          <a:xfrm flipV="1">
+            <a:off x="339669" y="709188"/>
+            <a:ext cx="4365679" cy="14712"/>
+          </a:xfrm>
+          <a:prstGeom prst="line">
+            <a:avLst/>
+          </a:prstGeom>
+          <a:ln w="38100">
+            <a:solidFill>
+              <a:srgbClr val="FF0000"/>
+            </a:solidFill>
+          </a:ln>
+        </p:spPr>
+        <p:style>
+          <a:lnRef idx="1">
+            <a:schemeClr val="accent1"/>
+          </a:lnRef>
+          <a:fillRef idx="0">
+            <a:schemeClr val="accent1"/>
+          </a:fillRef>
+          <a:effectRef idx="0">
+            <a:schemeClr val="accent1"/>
+          </a:effectRef>
+          <a:fontRef idx="minor">
+            <a:schemeClr val="tx1"/>
+          </a:fontRef>
+        </p:style>
+      </p:cxnSp>
+      <p:sp>
+        <p:nvSpPr>
+          <p:cNvPr id="126" name="TextBox 125">
+            <a:extLst>
+              <a:ext uri="{FF2B5EF4-FFF2-40B4-BE49-F238E27FC236}">
+                <a16:creationId xmlns:a16="http://schemas.microsoft.com/office/drawing/2014/main" id="{EEBF774E-0ABA-4D4C-8ABB-00B1A99A23E2}"/>
+              </a:ext>
+            </a:extLst>
+          </p:cNvPr>
+          <p:cNvSpPr txBox="1"/>
+          <p:nvPr/>
+        </p:nvSpPr>
+        <p:spPr>
+          <a:xfrm>
+            <a:off x="2385008" y="447578"/>
+            <a:ext cx="2320340" cy="523220"/>
+          </a:xfrm>
+          <a:prstGeom prst="rect">
+            <a:avLst/>
+          </a:prstGeom>
+          <a:noFill/>
+          <a:ln>
+            <a:noFill/>
+          </a:ln>
+        </p:spPr>
+        <p:txBody>
+          <a:bodyPr wrap="square" rtlCol="0">
+            <a:spAutoFit/>
+          </a:bodyPr>
+          <a:lstStyle/>
+          <a:p>
+            <a:r>
+              <a:rPr lang="en-CA" sz="1400" dirty="0"/>
+              <a:t>Red Line of Confidentiality/</a:t>
+            </a:r>
+            <a:br>
+              <a:rPr lang="en-CA" sz="1400" dirty="0"/>
+            </a:br>
+            <a:r>
+              <a:rPr lang="en-CA" sz="1400" dirty="0"/>
+              <a:t>Security/Authorization</a:t>
+            </a:r>
+          </a:p>
+        </p:txBody>
+      </p:sp>
+    </p:spTree>
+    <p:extLst>
+      <p:ext uri="{BB962C8B-B14F-4D97-AF65-F5344CB8AC3E}">
+        <p14:creationId xmlns:p14="http://schemas.microsoft.com/office/powerpoint/2010/main" val="4109196013"/>
       </p:ext>
     </p:extLst>
   </p:cSld>

</xml_diff>